<commit_message>
update prezentace pridani helpdesku
</commit_message>
<xml_diff>
--- a/Dokumenty/Iterace01.pptx
+++ b/Dokumenty/Iterace01.pptx
@@ -367,7 +367,7 @@
           <a:p>
             <a:fld id="{5A069CB8-F204-4D06-B913-C5A26A89888A}" type="datetimeFigureOut">
               <a:rPr lang="en-US" dirty="0"/>
-              <a:t>11/9/2020</a:t>
+              <a:t>11/10/2020</a:t>
             </a:fld>
             <a:endParaRPr lang="en-US" dirty="0"/>
           </a:p>
@@ -573,7 +573,7 @@
           <a:p>
             <a:fld id="{50B6E300-0A13-4A81-945A-7333C271A069}" type="datetimeFigureOut">
               <a:rPr lang="en-US" dirty="0"/>
-              <a:t>11/9/2020</a:t>
+              <a:t>11/10/2020</a:t>
             </a:fld>
             <a:endParaRPr lang="en-US" dirty="0"/>
           </a:p>
@@ -827,7 +827,7 @@
           <a:p>
             <a:fld id="{34671962-1EA4-46E7-BCB0-F36CE46D1A59}" type="datetimeFigureOut">
               <a:rPr lang="en-US" dirty="0"/>
-              <a:t>11/9/2020</a:t>
+              <a:t>11/10/2020</a:t>
             </a:fld>
             <a:endParaRPr lang="en-US" dirty="0"/>
           </a:p>
@@ -995,7 +995,7 @@
           <a:p>
             <a:fld id="{D30BB376-B19C-488D-ABEB-03C7E6E9E3E0}" type="datetimeFigureOut">
               <a:rPr lang="en-US" dirty="0"/>
-              <a:t>11/9/2020</a:t>
+              <a:t>11/10/2020</a:t>
             </a:fld>
             <a:endParaRPr lang="en-US" dirty="0"/>
           </a:p>
@@ -1337,7 +1337,7 @@
           <a:p>
             <a:fld id="{486F077B-A50F-4D64-8574-E2D6A98A5553}" type="datetimeFigureOut">
               <a:rPr lang="en-US" dirty="0"/>
-              <a:t>11/9/2020</a:t>
+              <a:t>11/10/2020</a:t>
             </a:fld>
             <a:endParaRPr lang="en-US" dirty="0"/>
           </a:p>
@@ -1609,7 +1609,7 @@
           <a:p>
             <a:fld id="{7D9E2A62-1983-43A1-A163-D8AA46534C80}" type="datetimeFigureOut">
               <a:rPr lang="en-US" dirty="0"/>
-              <a:t>11/9/2020</a:t>
+              <a:t>11/10/2020</a:t>
             </a:fld>
             <a:endParaRPr lang="en-US" dirty="0"/>
           </a:p>
@@ -1985,7 +1985,7 @@
           <a:p>
             <a:fld id="{898F3E3B-34E3-4345-B2A1-994B83598A9C}" type="datetimeFigureOut">
               <a:rPr lang="en-US" dirty="0"/>
-              <a:t>11/9/2020</a:t>
+              <a:t>11/10/2020</a:t>
             </a:fld>
             <a:endParaRPr lang="en-US" dirty="0"/>
           </a:p>
@@ -2102,7 +2102,7 @@
           <a:p>
             <a:fld id="{FD816C96-82A1-4D77-8ADA-627AC6FE3D65}" type="datetimeFigureOut">
               <a:rPr lang="en-US" dirty="0"/>
-              <a:t>11/9/2020</a:t>
+              <a:t>11/10/2020</a:t>
             </a:fld>
             <a:endParaRPr lang="en-US" dirty="0"/>
           </a:p>
@@ -2273,7 +2273,7 @@
           <a:p>
             <a:fld id="{1D102C1E-28F2-47E9-802D-339E64E2F920}" type="datetimeFigureOut">
               <a:rPr lang="en-US" dirty="0"/>
-              <a:t>11/9/2020</a:t>
+              <a:t>11/10/2020</a:t>
             </a:fld>
             <a:endParaRPr lang="en-US" dirty="0"/>
           </a:p>
@@ -2626,7 +2626,7 @@
           <a:p>
             <a:fld id="{24271A48-F18A-45B3-BC05-1E27DA3F88AF}" type="datetimeFigureOut">
               <a:rPr lang="en-US" dirty="0"/>
-              <a:t>11/9/2020</a:t>
+              <a:t>11/10/2020</a:t>
             </a:fld>
             <a:endParaRPr lang="en-US" dirty="0"/>
           </a:p>
@@ -2999,7 +2999,7 @@
           <a:p>
             <a:fld id="{65B747F8-9654-4282-85D2-65F41AAE7A75}" type="datetimeFigureOut">
               <a:rPr lang="en-US" dirty="0"/>
-              <a:t>11/9/2020</a:t>
+              <a:t>11/10/2020</a:t>
             </a:fld>
             <a:endParaRPr lang="en-US" dirty="0"/>
           </a:p>
@@ -3284,7 +3284,7 @@
           <a:p>
             <a:fld id="{5DC5B261-8843-42D1-AAFC-05E20E2D9B97}" type="datetimeFigureOut">
               <a:rPr lang="en-US" dirty="0"/>
-              <a:t>11/9/2020</a:t>
+              <a:t>11/10/2020</a:t>
             </a:fld>
             <a:endParaRPr lang="en-US" dirty="0"/>
           </a:p>
@@ -4003,16 +4003,156 @@
           </a:bodyPr>
           <a:lstStyle/>
           <a:p>
-            <a:r>
-              <a:rPr lang="cs-CZ" dirty="0">
-                <a:cs typeface="Calibri"/>
-              </a:rPr>
-              <a:t>Doplnit - Kuba</a:t>
-            </a:r>
+            <a:endParaRPr lang="en-US" dirty="0">
+              <a:cs typeface="Calibri"/>
+            </a:endParaRPr>
+          </a:p>
+          <a:p>
             <a:endParaRPr lang="cs-CZ" dirty="0"/>
           </a:p>
         </p:txBody>
       </p:sp>
+      <p:pic>
+        <p:nvPicPr>
+          <p:cNvPr id="1026" name="Picture 2">
+            <a:extLst>
+              <a:ext uri="{FF2B5EF4-FFF2-40B4-BE49-F238E27FC236}">
+                <a16:creationId xmlns:a16="http://schemas.microsoft.com/office/drawing/2014/main" id="{ED33A986-FB17-4320-B863-E7E4D0FFE102}"/>
+              </a:ext>
+            </a:extLst>
+          </p:cNvPr>
+          <p:cNvPicPr>
+            <a:picLocks noChangeAspect="1" noChangeArrowheads="1"/>
+          </p:cNvPicPr>
+          <p:nvPr/>
+        </p:nvPicPr>
+        <p:blipFill>
+          <a:blip r:embed="rId2">
+            <a:extLst>
+              <a:ext uri="{28A0092B-C50C-407E-A947-70E740481C1C}">
+                <a14:useLocalDpi xmlns:a14="http://schemas.microsoft.com/office/drawing/2010/main" val="0"/>
+              </a:ext>
+            </a:extLst>
+          </a:blip>
+          <a:srcRect/>
+          <a:stretch>
+            <a:fillRect/>
+          </a:stretch>
+        </p:blipFill>
+        <p:spPr bwMode="auto">
+          <a:xfrm>
+            <a:off x="1769110" y="4220847"/>
+            <a:ext cx="8258810" cy="2059528"/>
+          </a:xfrm>
+          <a:prstGeom prst="rect">
+            <a:avLst/>
+          </a:prstGeom>
+          <a:noFill/>
+          <a:extLst>
+            <a:ext uri="{909E8E84-426E-40DD-AFC4-6F175D3DCCD1}">
+              <a14:hiddenFill xmlns:a14="http://schemas.microsoft.com/office/drawing/2010/main">
+                <a:solidFill>
+                  <a:srgbClr val="FFFFFF"/>
+                </a:solidFill>
+              </a14:hiddenFill>
+            </a:ext>
+          </a:extLst>
+        </p:spPr>
+      </p:pic>
+      <p:pic>
+        <p:nvPicPr>
+          <p:cNvPr id="1027" name="Picture 3">
+            <a:extLst>
+              <a:ext uri="{FF2B5EF4-FFF2-40B4-BE49-F238E27FC236}">
+                <a16:creationId xmlns:a16="http://schemas.microsoft.com/office/drawing/2014/main" id="{3A71B82D-115A-4DD5-8FF0-685747212A42}"/>
+              </a:ext>
+            </a:extLst>
+          </p:cNvPr>
+          <p:cNvPicPr>
+            <a:picLocks noChangeAspect="1" noChangeArrowheads="1"/>
+          </p:cNvPicPr>
+          <p:nvPr/>
+        </p:nvPicPr>
+        <p:blipFill>
+          <a:blip r:embed="rId3">
+            <a:extLst>
+              <a:ext uri="{28A0092B-C50C-407E-A947-70E740481C1C}">
+                <a14:useLocalDpi xmlns:a14="http://schemas.microsoft.com/office/drawing/2010/main" val="0"/>
+              </a:ext>
+            </a:extLst>
+          </a:blip>
+          <a:srcRect/>
+          <a:stretch>
+            <a:fillRect/>
+          </a:stretch>
+        </p:blipFill>
+        <p:spPr bwMode="auto">
+          <a:xfrm>
+            <a:off x="1036320" y="1818307"/>
+            <a:ext cx="4297680" cy="2286733"/>
+          </a:xfrm>
+          <a:prstGeom prst="rect">
+            <a:avLst/>
+          </a:prstGeom>
+          <a:noFill/>
+          <a:extLst>
+            <a:ext uri="{909E8E84-426E-40DD-AFC4-6F175D3DCCD1}">
+              <a14:hiddenFill xmlns:a14="http://schemas.microsoft.com/office/drawing/2010/main">
+                <a:solidFill>
+                  <a:srgbClr val="FFFFFF"/>
+                </a:solidFill>
+              </a14:hiddenFill>
+            </a:ext>
+          </a:extLst>
+        </p:spPr>
+      </p:pic>
+      <p:pic>
+        <p:nvPicPr>
+          <p:cNvPr id="1028" name="Picture 4">
+            <a:extLst>
+              <a:ext uri="{FF2B5EF4-FFF2-40B4-BE49-F238E27FC236}">
+                <a16:creationId xmlns:a16="http://schemas.microsoft.com/office/drawing/2014/main" id="{330468F6-AB43-4283-9485-8E3FAE314A3B}"/>
+              </a:ext>
+            </a:extLst>
+          </p:cNvPr>
+          <p:cNvPicPr>
+            <a:picLocks noChangeAspect="1" noChangeArrowheads="1"/>
+          </p:cNvPicPr>
+          <p:nvPr/>
+        </p:nvPicPr>
+        <p:blipFill>
+          <a:blip r:embed="rId4">
+            <a:extLst>
+              <a:ext uri="{28A0092B-C50C-407E-A947-70E740481C1C}">
+                <a14:useLocalDpi xmlns:a14="http://schemas.microsoft.com/office/drawing/2010/main" val="0"/>
+              </a:ext>
+            </a:extLst>
+          </a:blip>
+          <a:srcRect/>
+          <a:stretch>
+            <a:fillRect/>
+          </a:stretch>
+        </p:blipFill>
+        <p:spPr bwMode="auto">
+          <a:xfrm>
+            <a:off x="6126480" y="1764787"/>
+            <a:ext cx="4717415" cy="2347686"/>
+          </a:xfrm>
+          <a:prstGeom prst="rect">
+            <a:avLst/>
+          </a:prstGeom>
+          <a:noFill/>
+          <a:extLst>
+            <a:ext uri="{909E8E84-426E-40DD-AFC4-6F175D3DCCD1}">
+              <a14:hiddenFill xmlns:a14="http://schemas.microsoft.com/office/drawing/2010/main">
+                <a:solidFill>
+                  <a:srgbClr val="FFFFFF"/>
+                </a:solidFill>
+              </a14:hiddenFill>
+            </a:ext>
+          </a:extLst>
+        </p:spPr>
+      </p:pic>
     </p:spTree>
     <p:extLst>
       <p:ext uri="{BB962C8B-B14F-4D97-AF65-F5344CB8AC3E}">
@@ -9611,6 +9751,15 @@
 </file>
 
 <file path=customXml/item1.xml><?xml version="1.0" encoding="utf-8"?>
+<?mso-contentType ?>
+<FormTemplates xmlns="http://schemas.microsoft.com/sharepoint/v3/contenttype/forms">
+  <Display>DocumentLibraryForm</Display>
+  <Edit>DocumentLibraryForm</Edit>
+  <New>DocumentLibraryForm</New>
+</FormTemplates>
+</file>
+
+<file path=customXml/item2.xml><?xml version="1.0" encoding="utf-8"?>
 <ct:contentTypeSchema xmlns:ct="http://schemas.microsoft.com/office/2006/metadata/contentType" xmlns:ma="http://schemas.microsoft.com/office/2006/metadata/properties/metaAttributes" ct:_="" ma:_="" ma:contentTypeName="Dokument" ma:contentTypeID="0x0101004F7B6DC845F01641AC1819E233C32348" ma:contentTypeVersion="6" ma:contentTypeDescription="Vytvoří nový dokument" ma:contentTypeScope="" ma:versionID="195fb975806c9b71bd4db80fda2f3649">
   <xsd:schema xmlns:xsd="http://www.w3.org/2001/XMLSchema" xmlns:xs="http://www.w3.org/2001/XMLSchema" xmlns:p="http://schemas.microsoft.com/office/2006/metadata/properties" xmlns:ns2="257ed0fd-0c01-4892-a7d0-e889d1c5a7c5" targetNamespace="http://schemas.microsoft.com/office/2006/metadata/properties" ma:root="true" ma:fieldsID="3a9d68afe9b8dca9cb99d9d19d8e5dc9" ns2:_="">
     <xsd:import namespace="257ed0fd-0c01-4892-a7d0-e889d1c5a7c5"/>
@@ -9768,15 +9917,6 @@
 </ct:contentTypeSchema>
 </file>
 
-<file path=customXml/item2.xml><?xml version="1.0" encoding="utf-8"?>
-<?mso-contentType ?>
-<FormTemplates xmlns="http://schemas.microsoft.com/sharepoint/v3/contenttype/forms">
-  <Display>DocumentLibraryForm</Display>
-  <Edit>DocumentLibraryForm</Edit>
-  <New>DocumentLibraryForm</New>
-</FormTemplates>
-</file>
-
 <file path=customXml/item3.xml><?xml version="1.0" encoding="utf-8"?>
 <p:properties xmlns:p="http://schemas.microsoft.com/office/2006/metadata/properties" xmlns:xsi="http://www.w3.org/2001/XMLSchema-instance" xmlns:pc="http://schemas.microsoft.com/office/infopath/2007/PartnerControls">
   <documentManagement/>
@@ -9784,6 +9924,14 @@
 </file>
 
 <file path=customXml/itemProps1.xml><?xml version="1.0" encoding="utf-8"?>
+<ds:datastoreItem xmlns:ds="http://schemas.openxmlformats.org/officeDocument/2006/customXml" ds:itemID="{0D0DD80C-AE77-4D09-AF92-8F872DA83A09}">
+  <ds:schemaRefs>
+    <ds:schemaRef ds:uri="http://schemas.microsoft.com/sharepoint/v3/contenttype/forms"/>
+  </ds:schemaRefs>
+</ds:datastoreItem>
+</file>
+
+<file path=customXml/itemProps2.xml><?xml version="1.0" encoding="utf-8"?>
 <ds:datastoreItem xmlns:ds="http://schemas.openxmlformats.org/officeDocument/2006/customXml" ds:itemID="{B11D7F54-175C-4195-A41A-CB31246B67EF}">
   <ds:schemaRefs>
     <ds:schemaRef ds:uri="http://schemas.microsoft.com/office/2006/metadata/contentType"/>
@@ -9797,14 +9945,6 @@
     <ds:schemaRef ds:uri="http://purl.org/dc/elements/1.1/"/>
     <ds:schemaRef ds:uri="http://purl.org/dc/terms/"/>
     <ds:schemaRef ds:uri="http://schemas.microsoft.com/internal/obd"/>
-  </ds:schemaRefs>
-</ds:datastoreItem>
-</file>
-
-<file path=customXml/itemProps2.xml><?xml version="1.0" encoding="utf-8"?>
-<ds:datastoreItem xmlns:ds="http://schemas.openxmlformats.org/officeDocument/2006/customXml" ds:itemID="{0D0DD80C-AE77-4D09-AF92-8F872DA83A09}">
-  <ds:schemaRefs>
-    <ds:schemaRef ds:uri="http://schemas.microsoft.com/sharepoint/v3/contenttype/forms"/>
   </ds:schemaRefs>
 </ds:datastoreItem>
 </file>

</xml_diff>